<commit_message>
Worked more on optimization
</commit_message>
<xml_diff>
--- a/Weekly Presentations/Week 6.pptx
+++ b/Weekly Presentations/Week 6.pptx
@@ -9,9 +9,10 @@
     <p:sldId id="257" r:id="rId3"/>
     <p:sldId id="262" r:id="rId4"/>
     <p:sldId id="258" r:id="rId5"/>
-    <p:sldId id="259" r:id="rId6"/>
-    <p:sldId id="260" r:id="rId7"/>
-    <p:sldId id="261" r:id="rId8"/>
+    <p:sldId id="263" r:id="rId6"/>
+    <p:sldId id="259" r:id="rId7"/>
+    <p:sldId id="260" r:id="rId8"/>
+    <p:sldId id="261" r:id="rId9"/>
   </p:sldIdLst>
   <p:sldSz cx="12192000" cy="6858000"/>
   <p:notesSz cx="6858000" cy="9144000"/>
@@ -110,6 +111,11 @@
       </a:defRPr>
     </a:lvl9pPr>
   </p:defaultTextStyle>
+  <p:extLst>
+    <p:ext uri="{EFAFB233-063F-42B5-8137-9DF3F51BA10A}">
+      <p15:sldGuideLst xmlns:p15="http://schemas.microsoft.com/office/powerpoint/2012/main"/>
+    </p:ext>
+  </p:extLst>
 </p:presentation>
 </file>
 
@@ -262,7 +268,7 @@
           <a:p>
             <a:fld id="{1BBB2E91-BA18-8F43-8533-0EE0A7C4EA51}" type="datetimeFigureOut">
               <a:rPr lang="en-US" smtClean="0"/>
-              <a:t>9/25/20</a:t>
+              <a:t>9/30/20</a:t>
             </a:fld>
             <a:endParaRPr lang="en-US"/>
           </a:p>
@@ -462,7 +468,7 @@
           <a:p>
             <a:fld id="{1BBB2E91-BA18-8F43-8533-0EE0A7C4EA51}" type="datetimeFigureOut">
               <a:rPr lang="en-US" smtClean="0"/>
-              <a:t>9/25/20</a:t>
+              <a:t>9/30/20</a:t>
             </a:fld>
             <a:endParaRPr lang="en-US"/>
           </a:p>
@@ -672,7 +678,7 @@
           <a:p>
             <a:fld id="{1BBB2E91-BA18-8F43-8533-0EE0A7C4EA51}" type="datetimeFigureOut">
               <a:rPr lang="en-US" smtClean="0"/>
-              <a:t>9/25/20</a:t>
+              <a:t>9/30/20</a:t>
             </a:fld>
             <a:endParaRPr lang="en-US"/>
           </a:p>
@@ -872,7 +878,7 @@
           <a:p>
             <a:fld id="{1BBB2E91-BA18-8F43-8533-0EE0A7C4EA51}" type="datetimeFigureOut">
               <a:rPr lang="en-US" smtClean="0"/>
-              <a:t>9/25/20</a:t>
+              <a:t>9/30/20</a:t>
             </a:fld>
             <a:endParaRPr lang="en-US"/>
           </a:p>
@@ -1148,7 +1154,7 @@
           <a:p>
             <a:fld id="{1BBB2E91-BA18-8F43-8533-0EE0A7C4EA51}" type="datetimeFigureOut">
               <a:rPr lang="en-US" smtClean="0"/>
-              <a:t>9/25/20</a:t>
+              <a:t>9/30/20</a:t>
             </a:fld>
             <a:endParaRPr lang="en-US"/>
           </a:p>
@@ -1416,7 +1422,7 @@
           <a:p>
             <a:fld id="{1BBB2E91-BA18-8F43-8533-0EE0A7C4EA51}" type="datetimeFigureOut">
               <a:rPr lang="en-US" smtClean="0"/>
-              <a:t>9/25/20</a:t>
+              <a:t>9/30/20</a:t>
             </a:fld>
             <a:endParaRPr lang="en-US"/>
           </a:p>
@@ -1831,7 +1837,7 @@
           <a:p>
             <a:fld id="{1BBB2E91-BA18-8F43-8533-0EE0A7C4EA51}" type="datetimeFigureOut">
               <a:rPr lang="en-US" smtClean="0"/>
-              <a:t>9/25/20</a:t>
+              <a:t>9/30/20</a:t>
             </a:fld>
             <a:endParaRPr lang="en-US"/>
           </a:p>
@@ -1973,7 +1979,7 @@
           <a:p>
             <a:fld id="{1BBB2E91-BA18-8F43-8533-0EE0A7C4EA51}" type="datetimeFigureOut">
               <a:rPr lang="en-US" smtClean="0"/>
-              <a:t>9/25/20</a:t>
+              <a:t>9/30/20</a:t>
             </a:fld>
             <a:endParaRPr lang="en-US"/>
           </a:p>
@@ -2086,7 +2092,7 @@
           <a:p>
             <a:fld id="{1BBB2E91-BA18-8F43-8533-0EE0A7C4EA51}" type="datetimeFigureOut">
               <a:rPr lang="en-US" smtClean="0"/>
-              <a:t>9/25/20</a:t>
+              <a:t>9/30/20</a:t>
             </a:fld>
             <a:endParaRPr lang="en-US"/>
           </a:p>
@@ -2399,7 +2405,7 @@
           <a:p>
             <a:fld id="{1BBB2E91-BA18-8F43-8533-0EE0A7C4EA51}" type="datetimeFigureOut">
               <a:rPr lang="en-US" smtClean="0"/>
-              <a:t>9/25/20</a:t>
+              <a:t>9/30/20</a:t>
             </a:fld>
             <a:endParaRPr lang="en-US"/>
           </a:p>
@@ -2688,7 +2694,7 @@
           <a:p>
             <a:fld id="{1BBB2E91-BA18-8F43-8533-0EE0A7C4EA51}" type="datetimeFigureOut">
               <a:rPr lang="en-US" smtClean="0"/>
-              <a:t>9/25/20</a:t>
+              <a:t>9/30/20</a:t>
             </a:fld>
             <a:endParaRPr lang="en-US"/>
           </a:p>
@@ -2931,7 +2937,7 @@
           <a:p>
             <a:fld id="{1BBB2E91-BA18-8F43-8533-0EE0A7C4EA51}" type="datetimeFigureOut">
               <a:rPr lang="en-US" smtClean="0"/>
-              <a:t>9/25/20</a:t>
+              <a:t>9/30/20</a:t>
             </a:fld>
             <a:endParaRPr lang="en-US"/>
           </a:p>
@@ -3457,7 +3463,7 @@
           <a:p>
             <a:r>
               <a:rPr lang="en-US" dirty="0"/>
-              <a:t>What I’ve Done</a:t>
+              <a:t>What I’ve Done – Compared three different angles</a:t>
             </a:r>
           </a:p>
         </p:txBody>
@@ -3727,7 +3733,7 @@
           <a:p>
             <a:r>
               <a:rPr lang="en-US" dirty="0"/>
-              <a:t>What Worked</a:t>
+              <a:t>What Worked – Graphical</a:t>
             </a:r>
           </a:p>
         </p:txBody>
@@ -3751,27 +3757,34 @@
         <p:spPr>
           <a:xfrm>
             <a:off x="838200" y="1825625"/>
-            <a:ext cx="10515600" cy="1603375"/>
+            <a:ext cx="10515600" cy="971867"/>
           </a:xfrm>
         </p:spPr>
         <p:txBody>
-          <a:bodyPr/>
-          <a:lstStyle/>
-          <a:p>
-            <a:r>
-              <a:rPr lang="en-US" dirty="0" err="1"/>
-              <a:t>Ga,f’dlask</a:t>
-            </a:r>
-            <a:endParaRPr lang="en-US" dirty="0"/>
+          <a:bodyPr>
+            <a:normAutofit fontScale="77500" lnSpcReduction="20000"/>
+          </a:bodyPr>
+          <a:lstStyle/>
+          <a:p>
+            <a:r>
+              <a:rPr lang="en-US" dirty="0"/>
+              <a:t>3 examples of trying to find the optimal angle</a:t>
+            </a:r>
+          </a:p>
+          <a:p>
+            <a:r>
+              <a:rPr lang="en-US" dirty="0"/>
+              <a:t>We can see that it converges to around the same angle (obviously we’ll need to make this more accurate)</a:t>
+            </a:r>
           </a:p>
         </p:txBody>
       </p:sp>
       <p:pic>
         <p:nvPicPr>
-          <p:cNvPr id="5" name="Picture 4" descr="A screenshot of a cell phone&#10;&#10;Description automatically generated">
-            <a:extLst>
-              <a:ext uri="{FF2B5EF4-FFF2-40B4-BE49-F238E27FC236}">
-                <a16:creationId xmlns:a16="http://schemas.microsoft.com/office/drawing/2014/main" id="{9C83FA1B-C955-7442-9F1A-50DD09C1F634}"/>
+          <p:cNvPr id="6" name="Picture 5" descr="Chart, histogram&#10;&#10;Description automatically generated">
+            <a:extLst>
+              <a:ext uri="{FF2B5EF4-FFF2-40B4-BE49-F238E27FC236}">
+                <a16:creationId xmlns:a16="http://schemas.microsoft.com/office/drawing/2014/main" id="{90D62FE3-CE1E-AC49-986E-B5064F70B6FF}"/>
               </a:ext>
             </a:extLst>
           </p:cNvPr>
@@ -3780,16 +3793,73 @@
           </p:cNvPicPr>
           <p:nvPr/>
         </p:nvPicPr>
-        <p:blipFill>
+        <p:blipFill rotWithShape="1">
           <a:blip r:embed="rId2"/>
-          <a:stretch>
-            <a:fillRect/>
-          </a:stretch>
+          <a:srcRect l="29294" t="10326" r="30843"/>
+          <a:stretch/>
         </p:blipFill>
         <p:spPr>
           <a:xfrm>
-            <a:off x="3422650" y="2546350"/>
-            <a:ext cx="5346700" cy="1765300"/>
+            <a:off x="1596627" y="2797492"/>
+            <a:ext cx="2328863" cy="3929062"/>
+          </a:xfrm>
+          <a:prstGeom prst="rect">
+            <a:avLst/>
+          </a:prstGeom>
+        </p:spPr>
+      </p:pic>
+      <p:pic>
+        <p:nvPicPr>
+          <p:cNvPr id="8" name="Picture 7" descr="Chart, histogram&#10;&#10;Description automatically generated">
+            <a:extLst>
+              <a:ext uri="{FF2B5EF4-FFF2-40B4-BE49-F238E27FC236}">
+                <a16:creationId xmlns:a16="http://schemas.microsoft.com/office/drawing/2014/main" id="{1F70A1B2-7E15-B34E-9936-48ACCBCD8966}"/>
+              </a:ext>
+            </a:extLst>
+          </p:cNvPr>
+          <p:cNvPicPr>
+            <a:picLocks noChangeAspect="1"/>
+          </p:cNvPicPr>
+          <p:nvPr/>
+        </p:nvPicPr>
+        <p:blipFill rotWithShape="1">
+          <a:blip r:embed="rId3"/>
+          <a:srcRect l="24729" t="10326" r="26929"/>
+          <a:stretch/>
+        </p:blipFill>
+        <p:spPr>
+          <a:xfrm>
+            <a:off x="4772618" y="2797492"/>
+            <a:ext cx="2824166" cy="3929062"/>
+          </a:xfrm>
+          <a:prstGeom prst="rect">
+            <a:avLst/>
+          </a:prstGeom>
+        </p:spPr>
+      </p:pic>
+      <p:pic>
+        <p:nvPicPr>
+          <p:cNvPr id="10" name="Picture 9" descr="Chart, histogram&#10;&#10;Description automatically generated">
+            <a:extLst>
+              <a:ext uri="{FF2B5EF4-FFF2-40B4-BE49-F238E27FC236}">
+                <a16:creationId xmlns:a16="http://schemas.microsoft.com/office/drawing/2014/main" id="{C379E978-FBAF-BD45-90FE-1A1ACD8F9246}"/>
+              </a:ext>
+            </a:extLst>
+          </p:cNvPr>
+          <p:cNvPicPr>
+            <a:picLocks noChangeAspect="1"/>
+          </p:cNvPicPr>
+          <p:nvPr/>
+        </p:nvPicPr>
+        <p:blipFill rotWithShape="1">
+          <a:blip r:embed="rId4"/>
+          <a:srcRect l="27582" t="10326" r="28153"/>
+          <a:stretch/>
+        </p:blipFill>
+        <p:spPr>
+          <a:xfrm>
+            <a:off x="8443912" y="2797491"/>
+            <a:ext cx="2586037" cy="3929063"/>
           </a:xfrm>
           <a:prstGeom prst="rect">
             <a:avLst/>
@@ -3831,7 +3901,7 @@
           <p:cNvPr id="2" name="Title 1">
             <a:extLst>
               <a:ext uri="{FF2B5EF4-FFF2-40B4-BE49-F238E27FC236}">
-                <a16:creationId xmlns:a16="http://schemas.microsoft.com/office/drawing/2014/main" id="{5861794F-3522-1F46-9AB7-DD03412C3204}"/>
+                <a16:creationId xmlns:a16="http://schemas.microsoft.com/office/drawing/2014/main" id="{4B512FEF-823B-744F-86FD-ABD48F5CBD06}"/>
               </a:ext>
             </a:extLst>
           </p:cNvPr>
@@ -3849,7 +3919,7 @@
           <a:p>
             <a:r>
               <a:rPr lang="en-US" dirty="0"/>
-              <a:t>What Didn’t Work</a:t>
+              <a:t>What Worked – Arrays </a:t>
             </a:r>
           </a:p>
         </p:txBody>
@@ -3859,7 +3929,7 @@
           <p:cNvPr id="3" name="Content Placeholder 2">
             <a:extLst>
               <a:ext uri="{FF2B5EF4-FFF2-40B4-BE49-F238E27FC236}">
-                <a16:creationId xmlns:a16="http://schemas.microsoft.com/office/drawing/2014/main" id="{21B19A6B-BBAB-DC4F-B67B-59FA59F82782}"/>
+                <a16:creationId xmlns:a16="http://schemas.microsoft.com/office/drawing/2014/main" id="{50ABB698-A660-0349-AB92-EAAF6887542C}"/>
               </a:ext>
             </a:extLst>
           </p:cNvPr>
@@ -3870,19 +3940,120 @@
             <p:ph idx="1"/>
           </p:nvPr>
         </p:nvSpPr>
-        <p:spPr/>
-        <p:txBody>
-          <a:bodyPr/>
-          <a:lstStyle/>
-          <a:p>
-            <a:endParaRPr lang="en-US"/>
-          </a:p>
-        </p:txBody>
-      </p:sp>
+        <p:spPr>
+          <a:xfrm>
+            <a:off x="838200" y="1825625"/>
+            <a:ext cx="10515600" cy="1146175"/>
+          </a:xfrm>
+        </p:spPr>
+        <p:txBody>
+          <a:bodyPr/>
+          <a:lstStyle/>
+          <a:p>
+            <a:r>
+              <a:rPr lang="en-US" dirty="0"/>
+              <a:t>Same 3 examples for finding the optimal angle as the last slide</a:t>
+            </a:r>
+          </a:p>
+          <a:p>
+            <a:endParaRPr lang="en-US" dirty="0"/>
+          </a:p>
+        </p:txBody>
+      </p:sp>
+      <p:pic>
+        <p:nvPicPr>
+          <p:cNvPr id="5" name="Picture 4" descr="A picture containing text&#10;&#10;Description automatically generated">
+            <a:extLst>
+              <a:ext uri="{FF2B5EF4-FFF2-40B4-BE49-F238E27FC236}">
+                <a16:creationId xmlns:a16="http://schemas.microsoft.com/office/drawing/2014/main" id="{9F9DE387-2C3F-6549-A62C-7C45DF32C2BF}"/>
+              </a:ext>
+            </a:extLst>
+          </p:cNvPr>
+          <p:cNvPicPr>
+            <a:picLocks noChangeAspect="1"/>
+          </p:cNvPicPr>
+          <p:nvPr/>
+        </p:nvPicPr>
+        <p:blipFill>
+          <a:blip r:embed="rId2"/>
+          <a:stretch>
+            <a:fillRect/>
+          </a:stretch>
+        </p:blipFill>
+        <p:spPr>
+          <a:xfrm>
+            <a:off x="2501900" y="2649537"/>
+            <a:ext cx="7188200" cy="914400"/>
+          </a:xfrm>
+          <a:prstGeom prst="rect">
+            <a:avLst/>
+          </a:prstGeom>
+        </p:spPr>
+      </p:pic>
+      <p:pic>
+        <p:nvPicPr>
+          <p:cNvPr id="7" name="Picture 6">
+            <a:extLst>
+              <a:ext uri="{FF2B5EF4-FFF2-40B4-BE49-F238E27FC236}">
+                <a16:creationId xmlns:a16="http://schemas.microsoft.com/office/drawing/2014/main" id="{DDB2B71C-E847-7B4B-9BCD-6A435C6E1440}"/>
+              </a:ext>
+            </a:extLst>
+          </p:cNvPr>
+          <p:cNvPicPr>
+            <a:picLocks noChangeAspect="1"/>
+          </p:cNvPicPr>
+          <p:nvPr/>
+        </p:nvPicPr>
+        <p:blipFill>
+          <a:blip r:embed="rId3"/>
+          <a:stretch>
+            <a:fillRect/>
+          </a:stretch>
+        </p:blipFill>
+        <p:spPr>
+          <a:xfrm>
+            <a:off x="2501900" y="3924299"/>
+            <a:ext cx="7150100" cy="723900"/>
+          </a:xfrm>
+          <a:prstGeom prst="rect">
+            <a:avLst/>
+          </a:prstGeom>
+        </p:spPr>
+      </p:pic>
+      <p:pic>
+        <p:nvPicPr>
+          <p:cNvPr id="9" name="Picture 8" descr="Text&#10;&#10;Description automatically generated">
+            <a:extLst>
+              <a:ext uri="{FF2B5EF4-FFF2-40B4-BE49-F238E27FC236}">
+                <a16:creationId xmlns:a16="http://schemas.microsoft.com/office/drawing/2014/main" id="{E089EBDF-7DE3-2943-A9E1-878B2DE4F50B}"/>
+              </a:ext>
+            </a:extLst>
+          </p:cNvPr>
+          <p:cNvPicPr>
+            <a:picLocks noChangeAspect="1"/>
+          </p:cNvPicPr>
+          <p:nvPr/>
+        </p:nvPicPr>
+        <p:blipFill>
+          <a:blip r:embed="rId4"/>
+          <a:stretch>
+            <a:fillRect/>
+          </a:stretch>
+        </p:blipFill>
+        <p:spPr>
+          <a:xfrm>
+            <a:off x="2489200" y="5008561"/>
+            <a:ext cx="7162800" cy="927100"/>
+          </a:xfrm>
+          <a:prstGeom prst="rect">
+            <a:avLst/>
+          </a:prstGeom>
+        </p:spPr>
+      </p:pic>
     </p:spTree>
     <p:extLst>
       <p:ext uri="{BB962C8B-B14F-4D97-AF65-F5344CB8AC3E}">
-        <p14:creationId xmlns:p14="http://schemas.microsoft.com/office/powerpoint/2010/main" val="3694036680"/>
+        <p14:creationId xmlns:p14="http://schemas.microsoft.com/office/powerpoint/2010/main" val="1046348205"/>
       </p:ext>
     </p:extLst>
   </p:cSld>
@@ -3914,6 +4085,89 @@
           <p:cNvPr id="2" name="Title 1">
             <a:extLst>
               <a:ext uri="{FF2B5EF4-FFF2-40B4-BE49-F238E27FC236}">
+                <a16:creationId xmlns:a16="http://schemas.microsoft.com/office/drawing/2014/main" id="{5861794F-3522-1F46-9AB7-DD03412C3204}"/>
+              </a:ext>
+            </a:extLst>
+          </p:cNvPr>
+          <p:cNvSpPr>
+            <a:spLocks noGrp="1"/>
+          </p:cNvSpPr>
+          <p:nvPr>
+            <p:ph type="title"/>
+          </p:nvPr>
+        </p:nvSpPr>
+        <p:spPr/>
+        <p:txBody>
+          <a:bodyPr/>
+          <a:lstStyle/>
+          <a:p>
+            <a:r>
+              <a:rPr lang="en-US" dirty="0"/>
+              <a:t>What Didn’t Work</a:t>
+            </a:r>
+          </a:p>
+        </p:txBody>
+      </p:sp>
+      <p:sp>
+        <p:nvSpPr>
+          <p:cNvPr id="3" name="Content Placeholder 2">
+            <a:extLst>
+              <a:ext uri="{FF2B5EF4-FFF2-40B4-BE49-F238E27FC236}">
+                <a16:creationId xmlns:a16="http://schemas.microsoft.com/office/drawing/2014/main" id="{21B19A6B-BBAB-DC4F-B67B-59FA59F82782}"/>
+              </a:ext>
+            </a:extLst>
+          </p:cNvPr>
+          <p:cNvSpPr>
+            <a:spLocks noGrp="1"/>
+          </p:cNvSpPr>
+          <p:nvPr>
+            <p:ph idx="1"/>
+          </p:nvPr>
+        </p:nvSpPr>
+        <p:spPr/>
+        <p:txBody>
+          <a:bodyPr/>
+          <a:lstStyle/>
+          <a:p>
+            <a:endParaRPr lang="en-US"/>
+          </a:p>
+        </p:txBody>
+      </p:sp>
+    </p:spTree>
+    <p:extLst>
+      <p:ext uri="{BB962C8B-B14F-4D97-AF65-F5344CB8AC3E}">
+        <p14:creationId xmlns:p14="http://schemas.microsoft.com/office/powerpoint/2010/main" val="3694036680"/>
+      </p:ext>
+    </p:extLst>
+  </p:cSld>
+  <p:clrMapOvr>
+    <a:masterClrMapping/>
+  </p:clrMapOvr>
+</p:sld>
+</file>
+
+<file path=ppt/slides/slide7.xml><?xml version="1.0" encoding="utf-8"?>
+<p:sld xmlns:a="http://schemas.openxmlformats.org/drawingml/2006/main" xmlns:r="http://schemas.openxmlformats.org/officeDocument/2006/relationships" xmlns:p="http://schemas.openxmlformats.org/presentationml/2006/main">
+  <p:cSld>
+    <p:spTree>
+      <p:nvGrpSpPr>
+        <p:cNvPr id="1" name=""/>
+        <p:cNvGrpSpPr/>
+        <p:nvPr/>
+      </p:nvGrpSpPr>
+      <p:grpSpPr>
+        <a:xfrm>
+          <a:off x="0" y="0"/>
+          <a:ext cx="0" cy="0"/>
+          <a:chOff x="0" y="0"/>
+          <a:chExt cx="0" cy="0"/>
+        </a:xfrm>
+      </p:grpSpPr>
+      <p:sp>
+        <p:nvSpPr>
+          <p:cNvPr id="2" name="Title 1">
+            <a:extLst>
+              <a:ext uri="{FF2B5EF4-FFF2-40B4-BE49-F238E27FC236}">
                 <a16:creationId xmlns:a16="http://schemas.microsoft.com/office/drawing/2014/main" id="{8A66E0C2-89A1-0B44-B9C5-A3440FCE125D}"/>
               </a:ext>
             </a:extLst>
@@ -3958,7 +4212,54 @@
           <a:bodyPr/>
           <a:lstStyle/>
           <a:p>
-            <a:endParaRPr lang="en-US"/>
+            <a:r>
+              <a:rPr lang="en-US" dirty="0"/>
+              <a:t>Parallelization</a:t>
+            </a:r>
+          </a:p>
+          <a:p>
+            <a:pPr lvl="1"/>
+            <a:r>
+              <a:rPr lang="en-US" dirty="0"/>
+              <a:t>We don’t want a for loop in </a:t>
+            </a:r>
+            <a:r>
+              <a:rPr lang="en-US" dirty="0" err="1"/>
+              <a:t>best_angle</a:t>
+            </a:r>
+            <a:r>
+              <a:rPr lang="en-US" dirty="0"/>
+              <a:t>, so do I change the parameter for </a:t>
+            </a:r>
+            <a:r>
+              <a:rPr lang="en-US" dirty="0" err="1"/>
+              <a:t>percent_in</a:t>
+            </a:r>
+            <a:r>
+              <a:rPr lang="en-US" dirty="0"/>
+              <a:t> from a single angle to an array? Would this then make a nested for loop in </a:t>
+            </a:r>
+            <a:r>
+              <a:rPr lang="en-US" dirty="0" err="1"/>
+              <a:t>percent_in</a:t>
+            </a:r>
+            <a:r>
+              <a:rPr lang="en-US" dirty="0"/>
+              <a:t>? How do I keep track of random angles and </a:t>
+            </a:r>
+            <a:r>
+              <a:rPr lang="en-US" dirty="0" err="1"/>
+              <a:t>percents</a:t>
+            </a:r>
+            <a:r>
+              <a:rPr lang="en-US" dirty="0"/>
+              <a:t> in in </a:t>
+            </a:r>
+            <a:r>
+              <a:rPr lang="en-US"/>
+              <a:t>an array?</a:t>
+            </a:r>
+            <a:endParaRPr lang="en-US" dirty="0"/>
           </a:p>
         </p:txBody>
       </p:sp>
@@ -3975,7 +4276,7 @@
 </p:sld>
 </file>
 
-<file path=ppt/slides/slide7.xml><?xml version="1.0" encoding="utf-8"?>
+<file path=ppt/slides/slide8.xml><?xml version="1.0" encoding="utf-8"?>
 <p:sld xmlns:a="http://schemas.openxmlformats.org/drawingml/2006/main" xmlns:r="http://schemas.openxmlformats.org/officeDocument/2006/relationships" xmlns:p="http://schemas.openxmlformats.org/presentationml/2006/main">
   <p:cSld>
     <p:spTree>

</xml_diff>